<commit_message>
Fixed error in leverage equation on slide 9
</commit_message>
<xml_diff>
--- a/multipleRegression/11a_linearRegressionDarren.pptx
+++ b/multipleRegression/11a_linearRegressionDarren.pptx
@@ -229,7 +229,7 @@
           <a:p>
             <a:fld id="{5297B160-92B4-4D76-9D0D-0780B343C2DC}" type="datetimeFigureOut">
               <a:rPr lang="en-US" smtClean="0"/>
-              <a:t>1/27/18</a:t>
+              <a:t>1/30/18</a:t>
             </a:fld>
             <a:endParaRPr lang="en-US"/>
           </a:p>
@@ -1563,7 +1563,7 @@
           <a:p>
             <a:fld id="{8138B808-925F-A744-9DAF-3BD61009A9A9}" type="datetime1">
               <a:rPr lang="en-US" smtClean="0"/>
-              <a:t>1/29/18</a:t>
+              <a:t>1/30/18</a:t>
             </a:fld>
             <a:endParaRPr lang="en-US"/>
           </a:p>
@@ -1771,7 +1771,7 @@
           <a:p>
             <a:fld id="{200F760C-48A9-0340-895A-EBA92DE17D33}" type="datetime1">
               <a:rPr lang="en-US" smtClean="0"/>
-              <a:t>1/29/18</a:t>
+              <a:t>1/30/18</a:t>
             </a:fld>
             <a:endParaRPr lang="en-US"/>
           </a:p>
@@ -2027,7 +2027,7 @@
           <a:p>
             <a:fld id="{8A659B47-3218-F748-B797-455EA8737104}" type="datetime1">
               <a:rPr lang="en-US" smtClean="0"/>
-              <a:t>1/29/18</a:t>
+              <a:t>1/30/18</a:t>
             </a:fld>
             <a:endParaRPr lang="en-US"/>
           </a:p>
@@ -2197,7 +2197,7 @@
           <a:p>
             <a:fld id="{704BEE38-C4BF-234D-A8A1-A9EDCD107FD4}" type="datetime1">
               <a:rPr lang="en-US" smtClean="0"/>
-              <a:t>1/29/18</a:t>
+              <a:t>1/30/18</a:t>
             </a:fld>
             <a:endParaRPr lang="en-US"/>
           </a:p>
@@ -2540,7 +2540,7 @@
           <a:p>
             <a:fld id="{0E62E0C2-BD2F-104C-8CEB-7B44B1BDA259}" type="datetime1">
               <a:rPr lang="en-US" smtClean="0"/>
-              <a:t>1/29/18</a:t>
+              <a:t>1/30/18</a:t>
             </a:fld>
             <a:endParaRPr lang="en-US"/>
           </a:p>
@@ -2815,7 +2815,7 @@
           <a:p>
             <a:fld id="{90054B1B-DC5D-6544-B78B-67975BF5A90D}" type="datetime1">
               <a:rPr lang="en-US" smtClean="0"/>
-              <a:t>1/29/18</a:t>
+              <a:t>1/30/18</a:t>
             </a:fld>
             <a:endParaRPr lang="en-US"/>
           </a:p>
@@ -3194,7 +3194,7 @@
           <a:p>
             <a:fld id="{F1D01F4F-8173-364A-9D31-B514129FE69D}" type="datetime1">
               <a:rPr lang="en-US" smtClean="0"/>
-              <a:t>1/29/18</a:t>
+              <a:t>1/30/18</a:t>
             </a:fld>
             <a:endParaRPr lang="en-US"/>
           </a:p>
@@ -3312,7 +3312,7 @@
           <a:p>
             <a:fld id="{7F427720-0981-874E-86E1-BC992939C362}" type="datetime1">
               <a:rPr lang="en-US" smtClean="0"/>
-              <a:t>1/29/18</a:t>
+              <a:t>1/30/18</a:t>
             </a:fld>
             <a:endParaRPr lang="en-US"/>
           </a:p>
@@ -3483,7 +3483,7 @@
           <a:p>
             <a:fld id="{A51AD593-3144-1B43-9924-18DDEA4C7C0E}" type="datetime1">
               <a:rPr lang="en-US" smtClean="0"/>
-              <a:t>1/29/18</a:t>
+              <a:t>1/30/18</a:t>
             </a:fld>
             <a:endParaRPr lang="en-US"/>
           </a:p>
@@ -3837,7 +3837,7 @@
           <a:p>
             <a:fld id="{A6EBC75B-4EBE-F141-83A4-5E166B5E65ED}" type="datetime1">
               <a:rPr lang="en-US" smtClean="0"/>
-              <a:t>1/29/18</a:t>
+              <a:t>1/30/18</a:t>
             </a:fld>
             <a:endParaRPr lang="en-US"/>
           </a:p>
@@ -4214,7 +4214,7 @@
           <a:p>
             <a:fld id="{99908CED-EEF4-D542-BF97-3D81696C356E}" type="datetime1">
               <a:rPr lang="en-US" smtClean="0"/>
-              <a:t>1/29/18</a:t>
+              <a:t>1/30/18</a:t>
             </a:fld>
             <a:endParaRPr lang="en-US"/>
           </a:p>
@@ -4501,7 +4501,7 @@
           <a:p>
             <a:fld id="{375405A8-69AF-E34C-9BC6-FE0B34ED4ABE}" type="datetime1">
               <a:rPr lang="en-US" smtClean="0"/>
-              <a:t>1/29/18</a:t>
+              <a:t>1/30/18</a:t>
             </a:fld>
             <a:endParaRPr lang="en-US"/>
           </a:p>
@@ -5183,8 +5183,8 @@
           </a:p>
         </p:txBody>
       </p:sp>
-      <mc:AlternateContent xmlns:mc="http://schemas.openxmlformats.org/markup-compatibility/2006">
-        <mc:Choice xmlns:a14="http://schemas.microsoft.com/office/drawing/2010/main" Requires="a14">
+      <mc:AlternateContent xmlns:mc="http://schemas.openxmlformats.org/markup-compatibility/2006" xmlns:a14="http://schemas.microsoft.com/office/drawing/2010/main">
+        <mc:Choice Requires="a14">
           <p:sp>
             <p:nvSpPr>
               <p:cNvPr id="3" name="Content Placeholder 2"/>
@@ -6374,7 +6374,7 @@
             </p:txBody>
           </p:sp>
         </mc:Choice>
-        <mc:Fallback>
+        <mc:Fallback xmlns="">
           <p:sp>
             <p:nvSpPr>
               <p:cNvPr id="3" name="Content Placeholder 2"/>
@@ -6472,8 +6472,8 @@
           <a:chExt cx="0" cy="0"/>
         </a:xfrm>
       </p:grpSpPr>
-      <mc:AlternateContent xmlns:mc="http://schemas.openxmlformats.org/markup-compatibility/2006">
-        <mc:Choice xmlns:a14="http://schemas.microsoft.com/office/drawing/2010/main" Requires="a14">
+      <mc:AlternateContent xmlns:mc="http://schemas.openxmlformats.org/markup-compatibility/2006" xmlns:a14="http://schemas.microsoft.com/office/drawing/2010/main">
+        <mc:Choice Requires="a14">
           <p:sp>
             <p:nvSpPr>
               <p:cNvPr id="11" name="Content Placeholder 2"/>
@@ -6697,7 +6697,15 @@
                                   <a:ea typeface="Cambria Math" charset="0"/>
                                   <a:cs typeface="Cambria Math" charset="0"/>
                                 </a:rPr>
-                                <m:t>1, </m:t>
+                                <m:t>1</m:t>
+                              </m:r>
+                              <m:r>
+                                <a:rPr lang="en-US" b="0" i="1" smtClean="0">
+                                  <a:latin typeface="Cambria Math" charset="0"/>
+                                  <a:ea typeface="Cambria Math" charset="0"/>
+                                  <a:cs typeface="Cambria Math" charset="0"/>
+                                </a:rPr>
+                                <m:t>, </m:t>
                               </m:r>
                               <m:sSup>
                                 <m:sSupPr>
@@ -6894,7 +6902,15 @@
                                   <a:ea typeface="Cambria Math" charset="0"/>
                                   <a:cs typeface="Cambria Math" charset="0"/>
                                 </a:rPr>
-                                <m:t>1,  </m:t>
+                                <m:t>1</m:t>
+                              </m:r>
+                              <m:r>
+                                <a:rPr lang="en-US" b="0" i="1" smtClean="0">
+                                  <a:latin typeface="Cambria Math" charset="0"/>
+                                  <a:ea typeface="Cambria Math" charset="0"/>
+                                  <a:cs typeface="Cambria Math" charset="0"/>
+                                </a:rPr>
+                                <m:t>,  </m:t>
                               </m:r>
                               <m:sSub>
                                 <m:sSubPr>
@@ -7270,7 +7286,7 @@
             </p:txBody>
           </p:sp>
         </mc:Choice>
-        <mc:Fallback>
+        <mc:Fallback xmlns="">
           <p:sp>
             <p:nvSpPr>
               <p:cNvPr id="11" name="Content Placeholder 2"/>
@@ -7325,22 +7341,14 @@
           <a:p>
             <a:r>
               <a:rPr lang="en-US" dirty="0" smtClean="0"/>
-              <a:t>Definition of Leverage for </a:t>
-            </a:r>
-            <a:r>
-              <a:rPr lang="en-US" dirty="0" smtClean="0"/>
-              <a:t>Multiple </a:t>
-            </a:r>
-            <a:r>
-              <a:rPr lang="en-US" dirty="0" smtClean="0"/>
-              <a:t>Linear Regression</a:t>
+              <a:t>Definition of Leverage for Multiple Linear Regression</a:t>
             </a:r>
             <a:endParaRPr lang="en-US" dirty="0"/>
           </a:p>
         </p:txBody>
       </p:sp>
-      <mc:AlternateContent xmlns:mc="http://schemas.openxmlformats.org/markup-compatibility/2006">
-        <mc:Choice xmlns:a14="http://schemas.microsoft.com/office/drawing/2010/main" Requires="a14">
+      <mc:AlternateContent xmlns:mc="http://schemas.openxmlformats.org/markup-compatibility/2006" xmlns:a14="http://schemas.microsoft.com/office/drawing/2010/main">
+        <mc:Choice Requires="a14">
           <p:sp>
             <p:nvSpPr>
               <p:cNvPr id="2" name="Rectangle 1"/>
@@ -7397,11 +7405,7 @@
                 </a14:m>
                 <a:r>
                   <a:rPr lang="en-US" dirty="0"/>
-                  <a:t>,</a:t>
-                </a:r>
-                <a:r>
-                  <a:rPr lang="en-US" dirty="0"/>
-                  <a:t> </a:t>
+                  <a:t>, </a:t>
                 </a:r>
                 <a14:m>
                   <m:oMath xmlns:m="http://schemas.openxmlformats.org/officeDocument/2006/math">
@@ -8392,6 +8396,7 @@
                 <a:endParaRPr lang="en-US" dirty="0"/>
               </a:p>
               <a:p>
+                <a:pPr/>
                 <a14:m>
                   <m:oMathPara xmlns:m="http://schemas.openxmlformats.org/officeDocument/2006/math">
                     <m:oMathParaPr>
@@ -8557,6 +8562,7 @@
                 </a:r>
               </a:p>
               <a:p>
+                <a:pPr/>
                 <a14:m>
                   <m:oMathPara xmlns:m="http://schemas.openxmlformats.org/officeDocument/2006/math">
                     <m:oMathParaPr>
@@ -8674,7 +8680,7 @@
             </p:txBody>
           </p:sp>
         </mc:Choice>
-        <mc:Fallback>
+        <mc:Fallback xmlns="">
           <p:sp>
             <p:nvSpPr>
               <p:cNvPr id="2" name="Rectangle 1"/>
@@ -8795,8 +8801,8 @@
           </a:p>
         </p:txBody>
       </p:sp>
-      <mc:AlternateContent xmlns:mc="http://schemas.openxmlformats.org/markup-compatibility/2006">
-        <mc:Choice xmlns:a14="http://schemas.microsoft.com/office/drawing/2010/main" Requires="a14">
+      <mc:AlternateContent xmlns:mc="http://schemas.openxmlformats.org/markup-compatibility/2006" xmlns:a14="http://schemas.microsoft.com/office/drawing/2010/main">
+        <mc:Choice Requires="a14">
           <p:sp>
             <p:nvSpPr>
               <p:cNvPr id="3" name="Content Placeholder 2"/>
@@ -8895,7 +8901,6 @@
                 </a:r>
               </a:p>
               <a:p>
-                <a:pPr/>
                 <a14:m>
                   <m:oMath xmlns:m="http://schemas.openxmlformats.org/officeDocument/2006/math">
                     <m:sSub>
@@ -8967,7 +8972,6 @@
                 <a:endParaRPr lang="en-US" dirty="0" smtClean="0"/>
               </a:p>
               <a:p>
-                <a:pPr/>
                 <a:r>
                   <a:rPr lang="en-US" sz="1800" dirty="0" smtClean="0"/>
                   <a:t>(that is, the </a:t>
@@ -9900,7 +9904,7 @@
             </p:txBody>
           </p:sp>
         </mc:Choice>
-        <mc:Fallback>
+        <mc:Fallback xmlns="">
           <p:sp>
             <p:nvSpPr>
               <p:cNvPr id="3" name="Content Placeholder 2"/>
@@ -9998,8 +10002,8 @@
           <a:chExt cx="0" cy="0"/>
         </a:xfrm>
       </p:grpSpPr>
-      <mc:AlternateContent xmlns:mc="http://schemas.openxmlformats.org/markup-compatibility/2006">
-        <mc:Choice xmlns:a14="http://schemas.microsoft.com/office/drawing/2010/main" Requires="a14">
+      <mc:AlternateContent xmlns:mc="http://schemas.openxmlformats.org/markup-compatibility/2006" xmlns:a14="http://schemas.microsoft.com/office/drawing/2010/main">
+        <mc:Choice Requires="a14">
           <p:sp>
             <p:nvSpPr>
               <p:cNvPr id="9" name="Content Placeholder 2"/>
@@ -10221,11 +10225,7 @@
                 </a14:m>
                 <a:r>
                   <a:rPr lang="en-US" dirty="0" smtClean="0"/>
-                  <a:t> in </a:t>
-                </a:r>
-                <a:r>
-                  <a:rPr lang="en-US" dirty="0" smtClean="0"/>
-                  <a:t>the model:</a:t>
+                  <a:t> in the model:</a:t>
                 </a:r>
               </a:p>
               <a:p>
@@ -10924,7 +10924,7 @@
             </p:txBody>
           </p:sp>
         </mc:Choice>
-        <mc:Fallback>
+        <mc:Fallback xmlns="">
           <p:sp>
             <p:nvSpPr>
               <p:cNvPr id="9" name="Content Placeholder 2"/>
@@ -11045,8 +11045,8 @@
           <a:chExt cx="0" cy="0"/>
         </a:xfrm>
       </p:grpSpPr>
-      <mc:AlternateContent xmlns:mc="http://schemas.openxmlformats.org/markup-compatibility/2006">
-        <mc:Choice xmlns:a14="http://schemas.microsoft.com/office/drawing/2010/main" Requires="a14">
+      <mc:AlternateContent xmlns:mc="http://schemas.openxmlformats.org/markup-compatibility/2006" xmlns:a14="http://schemas.microsoft.com/office/drawing/2010/main">
+        <mc:Choice Requires="a14">
           <p:sp>
             <p:nvSpPr>
               <p:cNvPr id="9" name="Content Placeholder 2"/>
@@ -11331,7 +11331,7 @@
                         <m:begChr m:val="|"/>
                         <m:endChr m:val="|"/>
                         <m:ctrlPr>
-                          <a:rPr lang="en-US" b="0" i="0" smtClean="0">
+                          <a:rPr lang="en-US" b="0" i="1" smtClean="0">
                             <a:latin typeface="Cambria Math" charset="0"/>
                           </a:rPr>
                         </m:ctrlPr>
@@ -11383,7 +11383,7 @@
             </p:txBody>
           </p:sp>
         </mc:Choice>
-        <mc:Fallback>
+        <mc:Fallback xmlns="">
           <p:sp>
             <p:nvSpPr>
               <p:cNvPr id="9" name="Content Placeholder 2"/>
@@ -11438,11 +11438,7 @@
           <a:p>
             <a:r>
               <a:rPr lang="en-US" dirty="0" smtClean="0"/>
-              <a:t>Normalized </a:t>
-            </a:r>
-            <a:r>
-              <a:rPr lang="en-US" dirty="0" smtClean="0"/>
-              <a:t>Residuals</a:t>
+              <a:t>Normalized Residuals</a:t>
             </a:r>
             <a:endParaRPr lang="en-US" dirty="0"/>
           </a:p>
@@ -11724,7 +11720,6 @@
               <a:rPr lang="en-US" sz="1700" dirty="0" smtClean="0"/>
               <a:t>(Important: We would expect 5% of observations to exceed this threshold)</a:t>
             </a:r>
-            <a:endParaRPr lang="en-US" sz="1700" dirty="0" smtClean="0"/>
           </a:p>
         </p:txBody>
       </p:sp>
@@ -12540,8 +12535,8 @@
           </a:p>
         </p:txBody>
       </p:sp>
-      <mc:AlternateContent xmlns:mc="http://schemas.openxmlformats.org/markup-compatibility/2006">
-        <mc:Choice xmlns:a14="http://schemas.microsoft.com/office/drawing/2010/main" Requires="a14">
+      <mc:AlternateContent xmlns:mc="http://schemas.openxmlformats.org/markup-compatibility/2006" xmlns:a14="http://schemas.microsoft.com/office/drawing/2010/main">
+        <mc:Choice Requires="a14">
           <p:sp>
             <p:nvSpPr>
               <p:cNvPr id="3" name="Content Placeholder 2"/>
@@ -12641,7 +12636,7 @@
             </p:txBody>
           </p:sp>
         </mc:Choice>
-        <mc:Fallback>
+        <mc:Fallback xmlns="">
           <p:sp>
             <p:nvSpPr>
               <p:cNvPr id="3" name="Content Placeholder 2"/>
@@ -12770,8 +12765,8 @@
           </a:p>
         </p:txBody>
       </p:sp>
-      <mc:AlternateContent xmlns:mc="http://schemas.openxmlformats.org/markup-compatibility/2006">
-        <mc:Choice xmlns:a14="http://schemas.microsoft.com/office/drawing/2010/main" Requires="a14">
+      <mc:AlternateContent xmlns:mc="http://schemas.openxmlformats.org/markup-compatibility/2006" xmlns:a14="http://schemas.microsoft.com/office/drawing/2010/main">
+        <mc:Choice Requires="a14">
           <p:sp>
             <p:nvSpPr>
               <p:cNvPr id="3" name="Content Placeholder 2"/>
@@ -13162,15 +13157,7 @@
               <a:p>
                 <a:r>
                   <a:rPr lang="en-US" dirty="0"/>
-                  <a:t> </a:t>
-                </a:r>
-                <a:r>
-                  <a:rPr lang="en-US" dirty="0"/>
-                  <a:t>  over </a:t>
-                </a:r>
-                <a:r>
-                  <a:rPr lang="en-US" dirty="0"/>
-                  <a:t>functions </a:t>
+                  <a:t>   over functions </a:t>
                 </a:r>
                 <a14:m>
                   <m:oMath xmlns:m="http://schemas.openxmlformats.org/officeDocument/2006/math">
@@ -13704,10 +13691,8 @@
                   <a:rPr lang="en-US" dirty="0"/>
                   <a:t>where </a:t>
                 </a:r>
-                <a:endParaRPr lang="en-US" dirty="0"/>
               </a:p>
               <a:p>
-                <a:pPr/>
                 <a14:m>
                   <m:oMath xmlns:m="http://schemas.openxmlformats.org/officeDocument/2006/math">
                     <m:sSub>
@@ -14213,7 +14198,7 @@
             </p:txBody>
           </p:sp>
         </mc:Choice>
-        <mc:Fallback>
+        <mc:Fallback xmlns="">
           <p:sp>
             <p:nvSpPr>
               <p:cNvPr id="3" name="Content Placeholder 2"/>
@@ -14342,8 +14327,8 @@
           </a:p>
         </p:txBody>
       </p:sp>
-      <mc:AlternateContent xmlns:mc="http://schemas.openxmlformats.org/markup-compatibility/2006">
-        <mc:Choice xmlns:a14="http://schemas.microsoft.com/office/drawing/2010/main" Requires="a14">
+      <mc:AlternateContent xmlns:mc="http://schemas.openxmlformats.org/markup-compatibility/2006" xmlns:a14="http://schemas.microsoft.com/office/drawing/2010/main">
+        <mc:Choice Requires="a14">
           <p:sp>
             <p:nvSpPr>
               <p:cNvPr id="3" name="Content Placeholder 2"/>
@@ -14950,7 +14935,7 @@
                         <m:begChr m:val="|"/>
                         <m:endChr m:val="|"/>
                         <m:ctrlPr>
-                          <a:rPr lang="en-US" b="0" i="0" smtClean="0">
+                          <a:rPr lang="en-US" b="0" i="1" smtClean="0">
                             <a:latin typeface="Cambria Math" charset="0"/>
                           </a:rPr>
                         </m:ctrlPr>
@@ -15000,7 +14985,7 @@
             </p:txBody>
           </p:sp>
         </mc:Choice>
-        <mc:Fallback>
+        <mc:Fallback xmlns="">
           <p:sp>
             <p:nvSpPr>
               <p:cNvPr id="3" name="Content Placeholder 2"/>
@@ -15038,8 +15023,8 @@
           </p:sp>
         </mc:Fallback>
       </mc:AlternateContent>
-      <mc:AlternateContent xmlns:mc="http://schemas.openxmlformats.org/markup-compatibility/2006">
-        <mc:Choice xmlns:a14="http://schemas.microsoft.com/office/drawing/2010/main" Requires="a14">
+      <mc:AlternateContent xmlns:mc="http://schemas.openxmlformats.org/markup-compatibility/2006" xmlns:a14="http://schemas.microsoft.com/office/drawing/2010/main">
+        <mc:Choice Requires="a14">
           <p:sp>
             <p:nvSpPr>
               <p:cNvPr id="5" name="TextBox 4"/>
@@ -15114,7 +15099,7 @@
             </p:txBody>
           </p:sp>
         </mc:Choice>
-        <mc:Fallback>
+        <mc:Fallback xmlns="">
           <p:sp>
             <p:nvSpPr>
               <p:cNvPr id="5" name="TextBox 4"/>
@@ -15259,8 +15244,8 @@
           </a:p>
         </p:txBody>
       </p:sp>
-      <mc:AlternateContent xmlns:mc="http://schemas.openxmlformats.org/markup-compatibility/2006">
-        <mc:Choice xmlns:a14="http://schemas.microsoft.com/office/drawing/2010/main" Requires="a14">
+      <mc:AlternateContent xmlns:mc="http://schemas.openxmlformats.org/markup-compatibility/2006" xmlns:a14="http://schemas.microsoft.com/office/drawing/2010/main">
+        <mc:Choice Requires="a14">
           <p:sp>
             <p:nvSpPr>
               <p:cNvPr id="10" name="TextBox 9"/>
@@ -15283,6 +15268,7 @@
               </a:bodyPr>
               <a:lstStyle/>
               <a:p>
+                <a:pPr/>
                 <a14:m>
                   <m:oMathPara xmlns:m="http://schemas.openxmlformats.org/officeDocument/2006/math">
                     <m:oMathParaPr>
@@ -15550,7 +15536,7 @@
             </p:txBody>
           </p:sp>
         </mc:Choice>
-        <mc:Fallback>
+        <mc:Fallback xmlns="">
           <p:sp>
             <p:nvSpPr>
               <p:cNvPr id="10" name="TextBox 9"/>
@@ -16271,8 +16257,8 @@
           </a:p>
         </p:txBody>
       </p:sp>
-      <mc:AlternateContent xmlns:mc="http://schemas.openxmlformats.org/markup-compatibility/2006">
-        <mc:Choice xmlns:a14="http://schemas.microsoft.com/office/drawing/2010/main" Requires="a14">
+      <mc:AlternateContent xmlns:mc="http://schemas.openxmlformats.org/markup-compatibility/2006" xmlns:a14="http://schemas.microsoft.com/office/drawing/2010/main">
+        <mc:Choice Requires="a14">
           <p:sp>
             <p:nvSpPr>
               <p:cNvPr id="3" name="Content Placeholder 2"/>
@@ -16398,7 +16384,7 @@
             </p:txBody>
           </p:sp>
         </mc:Choice>
-        <mc:Fallback>
+        <mc:Fallback xmlns="">
           <p:sp>
             <p:nvSpPr>
               <p:cNvPr id="3" name="Content Placeholder 2"/>
@@ -16805,11 +16791,7 @@
             </a:r>
             <a:r>
               <a:rPr lang="en-US" dirty="0" smtClean="0"/>
-              <a:t>An influential observation is an observation that has a disproportionate affect on the estimated regression </a:t>
-            </a:r>
-            <a:r>
-              <a:rPr lang="en-US" dirty="0" smtClean="0"/>
-              <a:t>model</a:t>
+              <a:t>An influential observation is an observation that has a disproportionate affect on the estimated regression model</a:t>
             </a:r>
           </a:p>
           <a:p>
@@ -16821,7 +16803,6 @@
               <a:rPr lang="en-US" dirty="0" smtClean="0"/>
               <a:t> Addressing influential observations is related to, but distinct from, assumption checking </a:t>
             </a:r>
-            <a:endParaRPr lang="en-US" dirty="0" smtClean="0"/>
           </a:p>
           <a:p>
             <a:pPr>
@@ -16834,15 +16815,7 @@
             </a:r>
             <a:r>
               <a:rPr lang="en-US" dirty="0" smtClean="0"/>
-              <a:t>As the estimated regression model is based </a:t>
-            </a:r>
-            <a:r>
-              <a:rPr lang="en-US" dirty="0" smtClean="0"/>
-              <a:t>on </a:t>
-            </a:r>
-            <a:r>
-              <a:rPr lang="en-US" dirty="0" smtClean="0"/>
-              <a:t>average squared deviations, it is very sensitive to observations that are extreme in some direction</a:t>
+              <a:t>As the estimated regression model is based on average squared deviations, it is very sensitive to observations that are extreme in some direction</a:t>
             </a:r>
           </a:p>
           <a:p>
@@ -17651,8 +17624,8 @@
           </a:prstGeom>
         </p:spPr>
       </p:pic>
-      <mc:AlternateContent xmlns:mc="http://schemas.openxmlformats.org/markup-compatibility/2006">
-        <mc:Choice xmlns:a14="http://schemas.microsoft.com/office/drawing/2010/main" Requires="a14">
+      <mc:AlternateContent xmlns:mc="http://schemas.openxmlformats.org/markup-compatibility/2006" xmlns:a14="http://schemas.microsoft.com/office/drawing/2010/main">
+        <mc:Choice Requires="a14">
           <p:sp>
             <p:nvSpPr>
               <p:cNvPr id="5" name="TextBox 4"/>
@@ -17708,7 +17681,7 @@
             </p:txBody>
           </p:sp>
         </mc:Choice>
-        <mc:Fallback>
+        <mc:Fallback xmlns="">
           <p:sp>
             <p:nvSpPr>
               <p:cNvPr id="5" name="TextBox 4"/>
@@ -17824,8 +17797,8 @@
           </a:p>
         </p:txBody>
       </p:sp>
-      <mc:AlternateContent xmlns:mc="http://schemas.openxmlformats.org/markup-compatibility/2006">
-        <mc:Choice xmlns:a14="http://schemas.microsoft.com/office/drawing/2010/main" Requires="a14">
+      <mc:AlternateContent xmlns:mc="http://schemas.openxmlformats.org/markup-compatibility/2006" xmlns:a14="http://schemas.microsoft.com/office/drawing/2010/main">
+        <mc:Choice Requires="a14">
           <p:sp>
             <p:nvSpPr>
               <p:cNvPr id="10" name="TextBox 9"/>
@@ -17924,7 +17897,7 @@
             </p:txBody>
           </p:sp>
         </mc:Choice>
-        <mc:Fallback>
+        <mc:Fallback xmlns="">
           <p:sp>
             <p:nvSpPr>
               <p:cNvPr id="10" name="TextBox 9"/>
@@ -18005,8 +17978,8 @@
           </a:p>
         </p:txBody>
       </p:sp>
-      <mc:AlternateContent xmlns:mc="http://schemas.openxmlformats.org/markup-compatibility/2006">
-        <mc:Choice xmlns:a14="http://schemas.microsoft.com/office/drawing/2010/main" Requires="a14">
+      <mc:AlternateContent xmlns:mc="http://schemas.openxmlformats.org/markup-compatibility/2006" xmlns:a14="http://schemas.microsoft.com/office/drawing/2010/main">
+        <mc:Choice Requires="a14">
           <p:sp>
             <p:nvSpPr>
               <p:cNvPr id="12" name="TextBox 11"/>
@@ -18105,7 +18078,7 @@
             </p:txBody>
           </p:sp>
         </mc:Choice>
-        <mc:Fallback>
+        <mc:Fallback xmlns="">
           <p:sp>
             <p:nvSpPr>
               <p:cNvPr id="12" name="TextBox 11"/>
@@ -18144,8 +18117,8 @@
           </p:sp>
         </mc:Fallback>
       </mc:AlternateContent>
-      <mc:AlternateContent xmlns:mc="http://schemas.openxmlformats.org/markup-compatibility/2006">
-        <mc:Choice xmlns:a14="http://schemas.microsoft.com/office/drawing/2010/main" Requires="a14">
+      <mc:AlternateContent xmlns:mc="http://schemas.openxmlformats.org/markup-compatibility/2006" xmlns:a14="http://schemas.microsoft.com/office/drawing/2010/main">
+        <mc:Choice Requires="a14">
           <p:sp>
             <p:nvSpPr>
               <p:cNvPr id="13" name="Rectangle 12"/>
@@ -18207,7 +18180,7 @@
             </p:txBody>
           </p:sp>
         </mc:Choice>
-        <mc:Fallback>
+        <mc:Fallback xmlns="">
           <p:sp>
             <p:nvSpPr>
               <p:cNvPr id="13" name="Rectangle 12"/>
@@ -18246,8 +18219,8 @@
           </p:sp>
         </mc:Fallback>
       </mc:AlternateContent>
-      <mc:AlternateContent xmlns:mc="http://schemas.openxmlformats.org/markup-compatibility/2006">
-        <mc:Choice xmlns:a14="http://schemas.microsoft.com/office/drawing/2010/main" Requires="a14">
+      <mc:AlternateContent xmlns:mc="http://schemas.openxmlformats.org/markup-compatibility/2006" xmlns:a14="http://schemas.microsoft.com/office/drawing/2010/main">
+        <mc:Choice Requires="a14">
           <p:sp>
             <p:nvSpPr>
               <p:cNvPr id="14" name="Rectangle 13"/>
@@ -18309,7 +18282,7 @@
             </p:txBody>
           </p:sp>
         </mc:Choice>
-        <mc:Fallback>
+        <mc:Fallback xmlns="">
           <p:sp>
             <p:nvSpPr>
               <p:cNvPr id="14" name="Rectangle 13"/>
@@ -18418,8 +18391,8 @@
           </a:fontRef>
         </p:style>
       </p:cxnSp>
-      <mc:AlternateContent xmlns:mc="http://schemas.openxmlformats.org/markup-compatibility/2006">
-        <mc:Choice xmlns:a14="http://schemas.microsoft.com/office/drawing/2010/main" Requires="a14">
+      <mc:AlternateContent xmlns:mc="http://schemas.openxmlformats.org/markup-compatibility/2006" xmlns:a14="http://schemas.microsoft.com/office/drawing/2010/main">
+        <mc:Choice Requires="a14">
           <p:sp>
             <p:nvSpPr>
               <p:cNvPr id="3" name="TextBox 2"/>
@@ -18471,7 +18444,7 @@
             </p:txBody>
           </p:sp>
         </mc:Choice>
-        <mc:Fallback>
+        <mc:Fallback xmlns="">
           <p:sp>
             <p:nvSpPr>
               <p:cNvPr id="3" name="TextBox 2"/>
@@ -18933,33 +18906,33 @@
                         </a:rPr>
                         <m:t>=</m:t>
                       </m:r>
-                      <m:sSup>
-                        <m:sSupPr>
+                      <m:f>
+                        <m:fPr>
                           <m:ctrlPr>
-                            <a:rPr lang="bg-BG" i="1">
+                            <a:rPr lang="bg-BG" i="1" smtClean="0">
                               <a:latin typeface="Cambria Math" charset="0"/>
                             </a:rPr>
                           </m:ctrlPr>
-                        </m:sSupPr>
-                        <m:e>
-                          <m:d>
-                            <m:dPr>
+                        </m:fPr>
+                        <m:num>
+                          <m:sSup>
+                            <m:sSupPr>
                               <m:ctrlPr>
-                                <a:rPr lang="is-IS" i="1">
+                                <a:rPr lang="bg-BG" i="1">
                                   <a:latin typeface="Cambria Math" charset="0"/>
                                 </a:rPr>
                               </m:ctrlPr>
-                            </m:dPr>
+                            </m:sSupPr>
                             <m:e>
-                              <m:f>
-                                <m:fPr>
+                              <m:d>
+                                <m:dPr>
                                   <m:ctrlPr>
-                                    <a:rPr lang="bg-BG" i="1">
+                                    <a:rPr lang="is-IS" i="1">
                                       <a:latin typeface="Cambria Math" charset="0"/>
                                     </a:rPr>
                                   </m:ctrlPr>
-                                </m:fPr>
-                                <m:num>
+                                </m:dPr>
+                                <m:e>
                                   <m:sSub>
                                     <m:sSubPr>
                                       <m:ctrlPr>
@@ -19009,117 +18982,117 @@
                                       </m:r>
                                     </m:e>
                                   </m:acc>
-                                </m:num>
-                                <m:den>
-                                  <m:nary>
-                                    <m:naryPr>
-                                      <m:chr m:val="∑"/>
-                                      <m:subHide m:val="on"/>
-                                      <m:supHide m:val="on"/>
+                                </m:e>
+                              </m:d>
+                            </m:e>
+                            <m:sup>
+                              <m:r>
+                                <a:rPr lang="en-US" i="1">
+                                  <a:latin typeface="Cambria Math" charset="0"/>
+                                </a:rPr>
+                                <m:t>2</m:t>
+                              </m:r>
+                            </m:sup>
+                          </m:sSup>
+                        </m:num>
+                        <m:den>
+                          <m:nary>
+                            <m:naryPr>
+                              <m:chr m:val="∑"/>
+                              <m:subHide m:val="on"/>
+                              <m:supHide m:val="on"/>
+                              <m:ctrlPr>
+                                <a:rPr lang="en-US" i="1">
+                                  <a:latin typeface="Cambria Math" charset="0"/>
+                                </a:rPr>
+                              </m:ctrlPr>
+                            </m:naryPr>
+                            <m:sub/>
+                            <m:sup/>
+                            <m:e>
+                              <m:sSup>
+                                <m:sSupPr>
+                                  <m:ctrlPr>
+                                    <a:rPr lang="en-US" i="1">
+                                      <a:latin typeface="Cambria Math" charset="0"/>
+                                    </a:rPr>
+                                  </m:ctrlPr>
+                                </m:sSupPr>
+                                <m:e>
+                                  <m:d>
+                                    <m:dPr>
                                       <m:ctrlPr>
-                                        <a:rPr lang="en-US" i="1" smtClean="0">
+                                        <a:rPr lang="is-IS" i="1">
                                           <a:latin typeface="Cambria Math" charset="0"/>
                                         </a:rPr>
                                       </m:ctrlPr>
-                                    </m:naryPr>
-                                    <m:sub/>
-                                    <m:sup/>
+                                    </m:dPr>
                                     <m:e>
-                                      <m:sSup>
-                                        <m:sSupPr>
+                                      <m:sSub>
+                                        <m:sSubPr>
                                           <m:ctrlPr>
-                                            <a:rPr lang="en-US" i="1" smtClean="0">
+                                            <a:rPr lang="en-US" i="1">
                                               <a:latin typeface="Cambria Math" charset="0"/>
                                             </a:rPr>
                                           </m:ctrlPr>
-                                        </m:sSupPr>
+                                        </m:sSubPr>
                                         <m:e>
-                                          <m:d>
-                                            <m:dPr>
-                                              <m:ctrlPr>
-                                                <a:rPr lang="is-IS" i="1" smtClean="0">
-                                                  <a:latin typeface="Cambria Math" charset="0"/>
-                                                </a:rPr>
-                                              </m:ctrlPr>
-                                            </m:dPr>
-                                            <m:e>
-                                              <m:sSub>
-                                                <m:sSubPr>
-                                                  <m:ctrlPr>
-                                                    <a:rPr lang="en-US" i="1">
-                                                      <a:latin typeface="Cambria Math" charset="0"/>
-                                                    </a:rPr>
-                                                  </m:ctrlPr>
-                                                </m:sSubPr>
-                                                <m:e>
-                                                  <m:r>
-                                                    <a:rPr lang="en-US" i="1">
-                                                      <a:latin typeface="Cambria Math" charset="0"/>
-                                                    </a:rPr>
-                                                    <m:t>𝑋</m:t>
-                                                  </m:r>
-                                                </m:e>
-                                                <m:sub>
-                                                  <m:r>
-                                                    <a:rPr lang="en-US" i="1">
-                                                      <a:latin typeface="Cambria Math" charset="0"/>
-                                                    </a:rPr>
-                                                    <m:t>𝑖</m:t>
-                                                  </m:r>
-                                                </m:sub>
-                                              </m:sSub>
-                                              <m:r>
-                                                <a:rPr lang="en-US" i="1">
-                                                  <a:latin typeface="Cambria Math" charset="0"/>
-                                                </a:rPr>
-                                                <m:t>−</m:t>
-                                              </m:r>
-                                              <m:acc>
-                                                <m:accPr>
-                                                  <m:chr m:val="̅"/>
-                                                  <m:ctrlPr>
-                                                    <a:rPr lang="en-US" i="1">
-                                                      <a:latin typeface="Cambria Math" charset="0"/>
-                                                    </a:rPr>
-                                                  </m:ctrlPr>
-                                                </m:accPr>
-                                                <m:e>
-                                                  <m:r>
-                                                    <a:rPr lang="en-US" i="1">
-                                                      <a:latin typeface="Cambria Math" charset="0"/>
-                                                    </a:rPr>
-                                                    <m:t>𝑋</m:t>
-                                                  </m:r>
-                                                </m:e>
-                                              </m:acc>
-                                            </m:e>
-                                          </m:d>
-                                        </m:e>
-                                        <m:sup>
                                           <m:r>
-                                            <a:rPr lang="en-US" b="0" i="1" smtClean="0">
+                                            <a:rPr lang="en-US" i="1">
                                               <a:latin typeface="Cambria Math" charset="0"/>
                                             </a:rPr>
-                                            <m:t>2</m:t>
+                                            <m:t>𝑋</m:t>
                                           </m:r>
-                                        </m:sup>
-                                      </m:sSup>
+                                        </m:e>
+                                        <m:sub>
+                                          <m:r>
+                                            <a:rPr lang="en-US" i="1">
+                                              <a:latin typeface="Cambria Math" charset="0"/>
+                                            </a:rPr>
+                                            <m:t>𝑖</m:t>
+                                          </m:r>
+                                        </m:sub>
+                                      </m:sSub>
+                                      <m:r>
+                                        <a:rPr lang="en-US" i="1">
+                                          <a:latin typeface="Cambria Math" charset="0"/>
+                                        </a:rPr>
+                                        <m:t>−</m:t>
+                                      </m:r>
+                                      <m:acc>
+                                        <m:accPr>
+                                          <m:chr m:val="̅"/>
+                                          <m:ctrlPr>
+                                            <a:rPr lang="en-US" i="1">
+                                              <a:latin typeface="Cambria Math" charset="0"/>
+                                            </a:rPr>
+                                          </m:ctrlPr>
+                                        </m:accPr>
+                                        <m:e>
+                                          <m:r>
+                                            <a:rPr lang="en-US" i="1">
+                                              <a:latin typeface="Cambria Math" charset="0"/>
+                                            </a:rPr>
+                                            <m:t>𝑋</m:t>
+                                          </m:r>
+                                        </m:e>
+                                      </m:acc>
                                     </m:e>
-                                  </m:nary>
-                                </m:den>
-                              </m:f>
+                                  </m:d>
+                                </m:e>
+                                <m:sup>
+                                  <m:r>
+                                    <a:rPr lang="en-US" i="1">
+                                      <a:latin typeface="Cambria Math" charset="0"/>
+                                    </a:rPr>
+                                    <m:t>2</m:t>
+                                  </m:r>
+                                </m:sup>
+                              </m:sSup>
                             </m:e>
-                          </m:d>
-                        </m:e>
-                        <m:sup>
-                          <m:r>
-                            <a:rPr lang="en-US" i="1">
-                              <a:latin typeface="Cambria Math" charset="0"/>
-                            </a:rPr>
-                            <m:t>2</m:t>
-                          </m:r>
-                        </m:sup>
-                      </m:sSup>
+                          </m:nary>
+                        </m:den>
+                      </m:f>
                       <m:r>
                         <a:rPr lang="en-US" i="1">
                           <a:latin typeface="Cambria Math" charset="0"/>

</xml_diff>